<commit_message>
fix: Ooxml types not recognized correctly
</commit_message>
<xml_diff>
--- a/test_files/ooxml/pptx_test.pptx
+++ b/test_files/ooxml/pptx_test.pptx
@@ -22,8 +22,7 @@
 <p:cmLst xmlns:p="http://schemas.openxmlformats.org/presentationml/2006/main">
   <p:cm authorId="0" dt="2024-09-02T17:36:55.000000000" idx="1">
     <p:pos x="0" y="0"/>
-    <p:text>
-https://comment.test.com/</p:text>
+    <p:text>https://comment.test.com/</p:text>
   </p:cm>
 </p:cmLst>
 </file>
@@ -52,7 +51,7 @@
             <a:spLocks noGrp="1"/>
           </p:cNvSpPr>
           <p:nvPr>
-            <p:ph type="ftr" idx="2"/>
+            <p:ph type="ftr" idx="1"/>
           </p:nvPr>
         </p:nvSpPr>
         <p:spPr/>
@@ -72,14 +71,14 @@
             <a:spLocks noGrp="1"/>
           </p:cNvSpPr>
           <p:nvPr>
-            <p:ph type="sldNum" idx="3"/>
-          </p:nvPr>
-        </p:nvSpPr>
-        <p:spPr/>
-        <p:txBody>
-          <a:bodyPr/>
-          <a:p>
-            <a:fld id="{B448B3A6-055C-42C2-B29B-413A712D22B1}" type="slidenum">
+            <p:ph type="sldNum" idx="2"/>
+          </p:nvPr>
+        </p:nvSpPr>
+        <p:spPr/>
+        <p:txBody>
+          <a:bodyPr/>
+          <a:p>
+            <a:fld id="{FFE01619-85BA-4D4D-A107-E17FF1E77F6F}" type="slidenum">
               <a:t>&lt;#&gt;</a:t>
             </a:fld>
           </a:p>
@@ -92,7 +91,7 @@
             <a:spLocks noGrp="1"/>
           </p:cNvSpPr>
           <p:nvPr>
-            <p:ph type="dt" idx="1"/>
+            <p:ph type="dt" idx="3"/>
           </p:nvPr>
         </p:nvSpPr>
         <p:spPr/>
@@ -130,7 +129,7 @@
       </p:grpSpPr>
       <p:sp>
         <p:nvSpPr>
-          <p:cNvPr id="26" name="PlaceHolder 1"/>
+          <p:cNvPr id="25" name="PlaceHolder 1"/>
           <p:cNvSpPr>
             <a:spLocks noGrp="1"/>
           </p:cNvSpPr>
@@ -141,7 +140,7 @@
         <p:spPr>
           <a:xfrm>
             <a:off x="504000" y="226080"/>
-            <a:ext cx="9071640" cy="946440"/>
+            <a:ext cx="9071280" cy="946080"/>
           </a:xfrm>
           <a:prstGeom prst="rect">
             <a:avLst/>
@@ -167,7 +166,7 @@
       </p:sp>
       <p:sp>
         <p:nvSpPr>
-          <p:cNvPr id="27" name="PlaceHolder 2"/>
+          <p:cNvPr id="26" name="PlaceHolder 2"/>
           <p:cNvSpPr>
             <a:spLocks noGrp="1"/>
           </p:cNvSpPr>
@@ -178,7 +177,7 @@
         <p:spPr>
           <a:xfrm>
             <a:off x="504000" y="1326600"/>
-            <a:ext cx="9071640" cy="1568160"/>
+            <a:ext cx="9072000" cy="1568520"/>
           </a:xfrm>
           <a:prstGeom prst="rect">
             <a:avLst/>
@@ -201,7 +200,7 @@
       </p:sp>
       <p:sp>
         <p:nvSpPr>
-          <p:cNvPr id="28" name="PlaceHolder 3"/>
+          <p:cNvPr id="27" name="PlaceHolder 3"/>
           <p:cNvSpPr>
             <a:spLocks noGrp="1"/>
           </p:cNvSpPr>
@@ -211,8 +210,8 @@
         </p:nvSpPr>
         <p:spPr>
           <a:xfrm>
-            <a:off x="504000" y="3044160"/>
-            <a:ext cx="9071640" cy="1568160"/>
+            <a:off x="504000" y="3044520"/>
+            <a:ext cx="9072000" cy="1568520"/>
           </a:xfrm>
           <a:prstGeom prst="rect">
             <a:avLst/>
@@ -240,7 +239,7 @@
             <a:spLocks noGrp="1"/>
           </p:cNvSpPr>
           <p:nvPr>
-            <p:ph type="ftr" idx="2"/>
+            <p:ph type="ftr" idx="1"/>
           </p:nvPr>
         </p:nvSpPr>
         <p:spPr/>
@@ -260,14 +259,14 @@
             <a:spLocks noGrp="1"/>
           </p:cNvSpPr>
           <p:nvPr>
-            <p:ph type="sldNum" idx="3"/>
-          </p:nvPr>
-        </p:nvSpPr>
-        <p:spPr/>
-        <p:txBody>
-          <a:bodyPr/>
-          <a:p>
-            <a:fld id="{15D823F1-2CB8-48C6-B326-A2CF5D7AFEBE}" type="slidenum">
+            <p:ph type="sldNum" idx="2"/>
+          </p:nvPr>
+        </p:nvSpPr>
+        <p:spPr/>
+        <p:txBody>
+          <a:bodyPr/>
+          <a:p>
+            <a:fld id="{49141AD2-B4DC-48A9-ACFF-E5720932996E}" type="slidenum">
               <a:t>&lt;#&gt;</a:t>
             </a:fld>
           </a:p>
@@ -280,7 +279,7 @@
             <a:spLocks noGrp="1"/>
           </p:cNvSpPr>
           <p:nvPr>
-            <p:ph type="dt" idx="1"/>
+            <p:ph type="dt" idx="3"/>
           </p:nvPr>
         </p:nvSpPr>
         <p:spPr/>
@@ -318,7 +317,7 @@
       </p:grpSpPr>
       <p:sp>
         <p:nvSpPr>
-          <p:cNvPr id="29" name="PlaceHolder 1"/>
+          <p:cNvPr id="28" name="PlaceHolder 1"/>
           <p:cNvSpPr>
             <a:spLocks noGrp="1"/>
           </p:cNvSpPr>
@@ -329,7 +328,7 @@
         <p:spPr>
           <a:xfrm>
             <a:off x="504000" y="226080"/>
-            <a:ext cx="9071640" cy="946440"/>
+            <a:ext cx="9071280" cy="946080"/>
           </a:xfrm>
           <a:prstGeom prst="rect">
             <a:avLst/>
@@ -355,7 +354,7 @@
       </p:sp>
       <p:sp>
         <p:nvSpPr>
-          <p:cNvPr id="30" name="PlaceHolder 2"/>
+          <p:cNvPr id="29" name="PlaceHolder 2"/>
           <p:cNvSpPr>
             <a:spLocks noGrp="1"/>
           </p:cNvSpPr>
@@ -366,7 +365,7 @@
         <p:spPr>
           <a:xfrm>
             <a:off x="504000" y="1326600"/>
-            <a:ext cx="4426920" cy="1568160"/>
+            <a:ext cx="4426920" cy="1568520"/>
           </a:xfrm>
           <a:prstGeom prst="rect">
             <a:avLst/>
@@ -389,7 +388,7 @@
       </p:sp>
       <p:sp>
         <p:nvSpPr>
-          <p:cNvPr id="31" name="PlaceHolder 3"/>
+          <p:cNvPr id="30" name="PlaceHolder 3"/>
           <p:cNvSpPr>
             <a:spLocks noGrp="1"/>
           </p:cNvSpPr>
@@ -400,7 +399,7 @@
         <p:spPr>
           <a:xfrm>
             <a:off x="5152680" y="1326600"/>
-            <a:ext cx="4426920" cy="1568160"/>
+            <a:ext cx="4426920" cy="1568520"/>
           </a:xfrm>
           <a:prstGeom prst="rect">
             <a:avLst/>
@@ -423,7 +422,7 @@
       </p:sp>
       <p:sp>
         <p:nvSpPr>
-          <p:cNvPr id="32" name="PlaceHolder 4"/>
+          <p:cNvPr id="31" name="PlaceHolder 4"/>
           <p:cNvSpPr>
             <a:spLocks noGrp="1"/>
           </p:cNvSpPr>
@@ -433,8 +432,8 @@
         </p:nvSpPr>
         <p:spPr>
           <a:xfrm>
-            <a:off x="504000" y="3044160"/>
-            <a:ext cx="4426920" cy="1568160"/>
+            <a:off x="504000" y="3044520"/>
+            <a:ext cx="4426920" cy="1568520"/>
           </a:xfrm>
           <a:prstGeom prst="rect">
             <a:avLst/>
@@ -457,7 +456,7 @@
       </p:sp>
       <p:sp>
         <p:nvSpPr>
-          <p:cNvPr id="33" name="PlaceHolder 5"/>
+          <p:cNvPr id="32" name="PlaceHolder 5"/>
           <p:cNvSpPr>
             <a:spLocks noGrp="1"/>
           </p:cNvSpPr>
@@ -467,8 +466,8 @@
         </p:nvSpPr>
         <p:spPr>
           <a:xfrm>
-            <a:off x="5152680" y="3044160"/>
-            <a:ext cx="4426920" cy="1568160"/>
+            <a:off x="5152680" y="3044520"/>
+            <a:ext cx="4426920" cy="1568520"/>
           </a:xfrm>
           <a:prstGeom prst="rect">
             <a:avLst/>
@@ -496,7 +495,7 @@
             <a:spLocks noGrp="1"/>
           </p:cNvSpPr>
           <p:nvPr>
-            <p:ph type="ftr" idx="2"/>
+            <p:ph type="ftr" idx="1"/>
           </p:nvPr>
         </p:nvSpPr>
         <p:spPr/>
@@ -516,14 +515,14 @@
             <a:spLocks noGrp="1"/>
           </p:cNvSpPr>
           <p:nvPr>
-            <p:ph type="sldNum" idx="3"/>
-          </p:nvPr>
-        </p:nvSpPr>
-        <p:spPr/>
-        <p:txBody>
-          <a:bodyPr/>
-          <a:p>
-            <a:fld id="{0FBE4224-0F98-4144-B625-8550335E80F8}" type="slidenum">
+            <p:ph type="sldNum" idx="2"/>
+          </p:nvPr>
+        </p:nvSpPr>
+        <p:spPr/>
+        <p:txBody>
+          <a:bodyPr/>
+          <a:p>
+            <a:fld id="{A8A83C36-7B1E-4E93-B694-6E856E28256D}" type="slidenum">
               <a:t>&lt;#&gt;</a:t>
             </a:fld>
           </a:p>
@@ -536,7 +535,7 @@
             <a:spLocks noGrp="1"/>
           </p:cNvSpPr>
           <p:nvPr>
-            <p:ph type="dt" idx="1"/>
+            <p:ph type="dt" idx="3"/>
           </p:nvPr>
         </p:nvSpPr>
         <p:spPr/>
@@ -574,7 +573,7 @@
       </p:grpSpPr>
       <p:sp>
         <p:nvSpPr>
-          <p:cNvPr id="34" name="PlaceHolder 1"/>
+          <p:cNvPr id="33" name="PlaceHolder 1"/>
           <p:cNvSpPr>
             <a:spLocks noGrp="1"/>
           </p:cNvSpPr>
@@ -585,7 +584,7 @@
         <p:spPr>
           <a:xfrm>
             <a:off x="504000" y="226080"/>
-            <a:ext cx="9071640" cy="946440"/>
+            <a:ext cx="9071280" cy="946080"/>
           </a:xfrm>
           <a:prstGeom prst="rect">
             <a:avLst/>
@@ -611,7 +610,7 @@
       </p:sp>
       <p:sp>
         <p:nvSpPr>
-          <p:cNvPr id="35" name="PlaceHolder 2"/>
+          <p:cNvPr id="34" name="PlaceHolder 2"/>
           <p:cNvSpPr>
             <a:spLocks noGrp="1"/>
           </p:cNvSpPr>
@@ -622,7 +621,7 @@
         <p:spPr>
           <a:xfrm>
             <a:off x="504000" y="1326600"/>
-            <a:ext cx="2920680" cy="1568160"/>
+            <a:ext cx="2921040" cy="1568520"/>
           </a:xfrm>
           <a:prstGeom prst="rect">
             <a:avLst/>
@@ -645,7 +644,7 @@
       </p:sp>
       <p:sp>
         <p:nvSpPr>
-          <p:cNvPr id="36" name="PlaceHolder 3"/>
+          <p:cNvPr id="35" name="PlaceHolder 3"/>
           <p:cNvSpPr>
             <a:spLocks noGrp="1"/>
           </p:cNvSpPr>
@@ -655,8 +654,8 @@
         </p:nvSpPr>
         <p:spPr>
           <a:xfrm>
-            <a:off x="3571200" y="1326600"/>
-            <a:ext cx="2920680" cy="1568160"/>
+            <a:off x="3571560" y="1326600"/>
+            <a:ext cx="2921040" cy="1568520"/>
           </a:xfrm>
           <a:prstGeom prst="rect">
             <a:avLst/>
@@ -679,7 +678,7 @@
       </p:sp>
       <p:sp>
         <p:nvSpPr>
-          <p:cNvPr id="37" name="PlaceHolder 4"/>
+          <p:cNvPr id="36" name="PlaceHolder 4"/>
           <p:cNvSpPr>
             <a:spLocks noGrp="1"/>
           </p:cNvSpPr>
@@ -689,8 +688,8 @@
         </p:nvSpPr>
         <p:spPr>
           <a:xfrm>
-            <a:off x="6638040" y="1326600"/>
-            <a:ext cx="2920680" cy="1568160"/>
+            <a:off x="6639120" y="1326600"/>
+            <a:ext cx="2921040" cy="1568520"/>
           </a:xfrm>
           <a:prstGeom prst="rect">
             <a:avLst/>
@@ -713,7 +712,7 @@
       </p:sp>
       <p:sp>
         <p:nvSpPr>
-          <p:cNvPr id="38" name="PlaceHolder 5"/>
+          <p:cNvPr id="37" name="PlaceHolder 5"/>
           <p:cNvSpPr>
             <a:spLocks noGrp="1"/>
           </p:cNvSpPr>
@@ -723,8 +722,8 @@
         </p:nvSpPr>
         <p:spPr>
           <a:xfrm>
-            <a:off x="504000" y="3044160"/>
-            <a:ext cx="2920680" cy="1568160"/>
+            <a:off x="504000" y="3044520"/>
+            <a:ext cx="2921040" cy="1568520"/>
           </a:xfrm>
           <a:prstGeom prst="rect">
             <a:avLst/>
@@ -747,7 +746,7 @@
       </p:sp>
       <p:sp>
         <p:nvSpPr>
-          <p:cNvPr id="39" name="PlaceHolder 6"/>
+          <p:cNvPr id="38" name="PlaceHolder 6"/>
           <p:cNvSpPr>
             <a:spLocks noGrp="1"/>
           </p:cNvSpPr>
@@ -757,8 +756,8 @@
         </p:nvSpPr>
         <p:spPr>
           <a:xfrm>
-            <a:off x="3571200" y="3044160"/>
-            <a:ext cx="2920680" cy="1568160"/>
+            <a:off x="3571560" y="3044520"/>
+            <a:ext cx="2921040" cy="1568520"/>
           </a:xfrm>
           <a:prstGeom prst="rect">
             <a:avLst/>
@@ -781,7 +780,7 @@
       </p:sp>
       <p:sp>
         <p:nvSpPr>
-          <p:cNvPr id="40" name="PlaceHolder 7"/>
+          <p:cNvPr id="39" name="PlaceHolder 7"/>
           <p:cNvSpPr>
             <a:spLocks noGrp="1"/>
           </p:cNvSpPr>
@@ -791,8 +790,8 @@
         </p:nvSpPr>
         <p:spPr>
           <a:xfrm>
-            <a:off x="6638040" y="3044160"/>
-            <a:ext cx="2920680" cy="1568160"/>
+            <a:off x="6639120" y="3044520"/>
+            <a:ext cx="2921040" cy="1568520"/>
           </a:xfrm>
           <a:prstGeom prst="rect">
             <a:avLst/>
@@ -820,7 +819,7 @@
             <a:spLocks noGrp="1"/>
           </p:cNvSpPr>
           <p:nvPr>
-            <p:ph type="ftr" idx="2"/>
+            <p:ph type="ftr" idx="1"/>
           </p:nvPr>
         </p:nvSpPr>
         <p:spPr/>
@@ -840,14 +839,14 @@
             <a:spLocks noGrp="1"/>
           </p:cNvSpPr>
           <p:nvPr>
-            <p:ph type="sldNum" idx="3"/>
-          </p:nvPr>
-        </p:nvSpPr>
-        <p:spPr/>
-        <p:txBody>
-          <a:bodyPr/>
-          <a:p>
-            <a:fld id="{DE4F6FB1-D57F-488E-8D8B-F16955C7C692}" type="slidenum">
+            <p:ph type="sldNum" idx="2"/>
+          </p:nvPr>
+        </p:nvSpPr>
+        <p:spPr/>
+        <p:txBody>
+          <a:bodyPr/>
+          <a:p>
+            <a:fld id="{5A4801C1-4C5C-4D3B-89AE-34457CA12F50}" type="slidenum">
               <a:t>&lt;#&gt;</a:t>
             </a:fld>
           </a:p>
@@ -860,7 +859,7 @@
             <a:spLocks noGrp="1"/>
           </p:cNvSpPr>
           <p:nvPr>
-            <p:ph type="dt" idx="1"/>
+            <p:ph type="dt" idx="3"/>
           </p:nvPr>
         </p:nvSpPr>
         <p:spPr/>
@@ -898,7 +897,7 @@
       </p:grpSpPr>
       <p:sp>
         <p:nvSpPr>
-          <p:cNvPr id="5" name="PlaceHolder 1"/>
+          <p:cNvPr id="4" name="PlaceHolder 1"/>
           <p:cNvSpPr>
             <a:spLocks noGrp="1"/>
           </p:cNvSpPr>
@@ -909,7 +908,7 @@
         <p:spPr>
           <a:xfrm>
             <a:off x="504000" y="226080"/>
-            <a:ext cx="9071640" cy="946440"/>
+            <a:ext cx="9071280" cy="946080"/>
           </a:xfrm>
           <a:prstGeom prst="rect">
             <a:avLst/>
@@ -935,7 +934,7 @@
       </p:sp>
       <p:sp>
         <p:nvSpPr>
-          <p:cNvPr id="6" name="PlaceHolder 2"/>
+          <p:cNvPr id="5" name="PlaceHolder 2"/>
           <p:cNvSpPr>
             <a:spLocks noGrp="1"/>
           </p:cNvSpPr>
@@ -946,7 +945,7 @@
         <p:spPr>
           <a:xfrm>
             <a:off x="504000" y="1326600"/>
-            <a:ext cx="9071640" cy="3288240"/>
+            <a:ext cx="9072000" cy="3288600"/>
           </a:xfrm>
           <a:prstGeom prst="rect">
             <a:avLst/>
@@ -977,7 +976,7 @@
             <a:spLocks noGrp="1"/>
           </p:cNvSpPr>
           <p:nvPr>
-            <p:ph type="ftr" idx="2"/>
+            <p:ph type="ftr" idx="1"/>
           </p:nvPr>
         </p:nvSpPr>
         <p:spPr/>
@@ -997,14 +996,14 @@
             <a:spLocks noGrp="1"/>
           </p:cNvSpPr>
           <p:nvPr>
-            <p:ph type="sldNum" idx="3"/>
-          </p:nvPr>
-        </p:nvSpPr>
-        <p:spPr/>
-        <p:txBody>
-          <a:bodyPr/>
-          <a:p>
-            <a:fld id="{0F9A2D0C-659E-4622-A66A-5121EF5179A4}" type="slidenum">
+            <p:ph type="sldNum" idx="2"/>
+          </p:nvPr>
+        </p:nvSpPr>
+        <p:spPr/>
+        <p:txBody>
+          <a:bodyPr/>
+          <a:p>
+            <a:fld id="{2B5A901B-436C-499D-BE4A-6C8EED7895BC}" type="slidenum">
               <a:t>&lt;#&gt;</a:t>
             </a:fld>
           </a:p>
@@ -1017,7 +1016,7 @@
             <a:spLocks noGrp="1"/>
           </p:cNvSpPr>
           <p:nvPr>
-            <p:ph type="dt" idx="1"/>
+            <p:ph type="dt" idx="3"/>
           </p:nvPr>
         </p:nvSpPr>
         <p:spPr/>
@@ -1055,7 +1054,7 @@
       </p:grpSpPr>
       <p:sp>
         <p:nvSpPr>
-          <p:cNvPr id="7" name="PlaceHolder 1"/>
+          <p:cNvPr id="6" name="PlaceHolder 1"/>
           <p:cNvSpPr>
             <a:spLocks noGrp="1"/>
           </p:cNvSpPr>
@@ -1066,7 +1065,7 @@
         <p:spPr>
           <a:xfrm>
             <a:off x="504000" y="226080"/>
-            <a:ext cx="9071640" cy="946440"/>
+            <a:ext cx="9071280" cy="946080"/>
           </a:xfrm>
           <a:prstGeom prst="rect">
             <a:avLst/>
@@ -1092,7 +1091,7 @@
       </p:sp>
       <p:sp>
         <p:nvSpPr>
-          <p:cNvPr id="8" name="PlaceHolder 2"/>
+          <p:cNvPr id="7" name="PlaceHolder 2"/>
           <p:cNvSpPr>
             <a:spLocks noGrp="1"/>
           </p:cNvSpPr>
@@ -1103,7 +1102,7 @@
         <p:spPr>
           <a:xfrm>
             <a:off x="504000" y="1326600"/>
-            <a:ext cx="9071640" cy="3288240"/>
+            <a:ext cx="9072000" cy="3288600"/>
           </a:xfrm>
           <a:prstGeom prst="rect">
             <a:avLst/>
@@ -1131,7 +1130,7 @@
             <a:spLocks noGrp="1"/>
           </p:cNvSpPr>
           <p:nvPr>
-            <p:ph type="ftr" idx="2"/>
+            <p:ph type="ftr" idx="1"/>
           </p:nvPr>
         </p:nvSpPr>
         <p:spPr/>
@@ -1151,14 +1150,14 @@
             <a:spLocks noGrp="1"/>
           </p:cNvSpPr>
           <p:nvPr>
-            <p:ph type="sldNum" idx="3"/>
-          </p:nvPr>
-        </p:nvSpPr>
-        <p:spPr/>
-        <p:txBody>
-          <a:bodyPr/>
-          <a:p>
-            <a:fld id="{6F7FEB6C-BAC7-4CE1-A762-693F0E2E62F6}" type="slidenum">
+            <p:ph type="sldNum" idx="2"/>
+          </p:nvPr>
+        </p:nvSpPr>
+        <p:spPr/>
+        <p:txBody>
+          <a:bodyPr/>
+          <a:p>
+            <a:fld id="{B05CC710-7E2F-4FFE-AB8D-6E38005930F2}" type="slidenum">
               <a:t>&lt;#&gt;</a:t>
             </a:fld>
           </a:p>
@@ -1171,7 +1170,7 @@
             <a:spLocks noGrp="1"/>
           </p:cNvSpPr>
           <p:nvPr>
-            <p:ph type="dt" idx="1"/>
+            <p:ph type="dt" idx="3"/>
           </p:nvPr>
         </p:nvSpPr>
         <p:spPr/>
@@ -1209,7 +1208,7 @@
       </p:grpSpPr>
       <p:sp>
         <p:nvSpPr>
-          <p:cNvPr id="9" name="PlaceHolder 1"/>
+          <p:cNvPr id="8" name="PlaceHolder 1"/>
           <p:cNvSpPr>
             <a:spLocks noGrp="1"/>
           </p:cNvSpPr>
@@ -1220,7 +1219,7 @@
         <p:spPr>
           <a:xfrm>
             <a:off x="504000" y="226080"/>
-            <a:ext cx="9071640" cy="946440"/>
+            <a:ext cx="9071280" cy="946080"/>
           </a:xfrm>
           <a:prstGeom prst="rect">
             <a:avLst/>
@@ -1246,7 +1245,7 @@
       </p:sp>
       <p:sp>
         <p:nvSpPr>
-          <p:cNvPr id="10" name="PlaceHolder 2"/>
+          <p:cNvPr id="9" name="PlaceHolder 2"/>
           <p:cNvSpPr>
             <a:spLocks noGrp="1"/>
           </p:cNvSpPr>
@@ -1257,7 +1256,7 @@
         <p:spPr>
           <a:xfrm>
             <a:off x="504000" y="1326600"/>
-            <a:ext cx="4426920" cy="3288240"/>
+            <a:ext cx="4426920" cy="3288600"/>
           </a:xfrm>
           <a:prstGeom prst="rect">
             <a:avLst/>
@@ -1280,7 +1279,7 @@
       </p:sp>
       <p:sp>
         <p:nvSpPr>
-          <p:cNvPr id="11" name="PlaceHolder 3"/>
+          <p:cNvPr id="10" name="PlaceHolder 3"/>
           <p:cNvSpPr>
             <a:spLocks noGrp="1"/>
           </p:cNvSpPr>
@@ -1291,7 +1290,7 @@
         <p:spPr>
           <a:xfrm>
             <a:off x="5152680" y="1326600"/>
-            <a:ext cx="4426920" cy="3288240"/>
+            <a:ext cx="4426920" cy="3288600"/>
           </a:xfrm>
           <a:prstGeom prst="rect">
             <a:avLst/>
@@ -1319,7 +1318,7 @@
             <a:spLocks noGrp="1"/>
           </p:cNvSpPr>
           <p:nvPr>
-            <p:ph type="ftr" idx="2"/>
+            <p:ph type="ftr" idx="1"/>
           </p:nvPr>
         </p:nvSpPr>
         <p:spPr/>
@@ -1339,14 +1338,14 @@
             <a:spLocks noGrp="1"/>
           </p:cNvSpPr>
           <p:nvPr>
-            <p:ph type="sldNum" idx="3"/>
-          </p:nvPr>
-        </p:nvSpPr>
-        <p:spPr/>
-        <p:txBody>
-          <a:bodyPr/>
-          <a:p>
-            <a:fld id="{10A2D620-6480-4C95-8680-908516B2B615}" type="slidenum">
+            <p:ph type="sldNum" idx="2"/>
+          </p:nvPr>
+        </p:nvSpPr>
+        <p:spPr/>
+        <p:txBody>
+          <a:bodyPr/>
+          <a:p>
+            <a:fld id="{E560367B-2AB4-4B91-AD2D-DCBD7248BBAB}" type="slidenum">
               <a:t>&lt;#&gt;</a:t>
             </a:fld>
           </a:p>
@@ -1359,7 +1358,7 @@
             <a:spLocks noGrp="1"/>
           </p:cNvSpPr>
           <p:nvPr>
-            <p:ph type="dt" idx="1"/>
+            <p:ph type="dt" idx="3"/>
           </p:nvPr>
         </p:nvSpPr>
         <p:spPr/>
@@ -1397,7 +1396,7 @@
       </p:grpSpPr>
       <p:sp>
         <p:nvSpPr>
-          <p:cNvPr id="12" name="PlaceHolder 1"/>
+          <p:cNvPr id="11" name="PlaceHolder 1"/>
           <p:cNvSpPr>
             <a:spLocks noGrp="1"/>
           </p:cNvSpPr>
@@ -1408,7 +1407,7 @@
         <p:spPr>
           <a:xfrm>
             <a:off x="504000" y="226080"/>
-            <a:ext cx="9071640" cy="946440"/>
+            <a:ext cx="9071280" cy="946080"/>
           </a:xfrm>
           <a:prstGeom prst="rect">
             <a:avLst/>
@@ -1439,7 +1438,7 @@
             <a:spLocks noGrp="1"/>
           </p:cNvSpPr>
           <p:nvPr>
-            <p:ph type="ftr" idx="2"/>
+            <p:ph type="ftr" idx="1"/>
           </p:nvPr>
         </p:nvSpPr>
         <p:spPr/>
@@ -1459,14 +1458,14 @@
             <a:spLocks noGrp="1"/>
           </p:cNvSpPr>
           <p:nvPr>
-            <p:ph type="sldNum" idx="3"/>
-          </p:nvPr>
-        </p:nvSpPr>
-        <p:spPr/>
-        <p:txBody>
-          <a:bodyPr/>
-          <a:p>
-            <a:fld id="{A78F84DF-8D39-487F-96F3-EA0D087C7250}" type="slidenum">
+            <p:ph type="sldNum" idx="2"/>
+          </p:nvPr>
+        </p:nvSpPr>
+        <p:spPr/>
+        <p:txBody>
+          <a:bodyPr/>
+          <a:p>
+            <a:fld id="{2B600803-9D37-4B1C-8593-067E2B7A2452}" type="slidenum">
               <a:t>&lt;#&gt;</a:t>
             </a:fld>
           </a:p>
@@ -1479,7 +1478,7 @@
             <a:spLocks noGrp="1"/>
           </p:cNvSpPr>
           <p:nvPr>
-            <p:ph type="dt" idx="1"/>
+            <p:ph type="dt" idx="3"/>
           </p:nvPr>
         </p:nvSpPr>
         <p:spPr/>
@@ -1517,7 +1516,7 @@
       </p:grpSpPr>
       <p:sp>
         <p:nvSpPr>
-          <p:cNvPr id="13" name="PlaceHolder 1"/>
+          <p:cNvPr id="12" name="PlaceHolder 1"/>
           <p:cNvSpPr>
             <a:spLocks noGrp="1"/>
           </p:cNvSpPr>
@@ -1528,7 +1527,7 @@
         <p:spPr>
           <a:xfrm>
             <a:off x="504000" y="226080"/>
-            <a:ext cx="9071640" cy="4388400"/>
+            <a:ext cx="9071280" cy="4386600"/>
           </a:xfrm>
           <a:prstGeom prst="rect">
             <a:avLst/>
@@ -1559,7 +1558,7 @@
             <a:spLocks noGrp="1"/>
           </p:cNvSpPr>
           <p:nvPr>
-            <p:ph type="ftr" idx="2"/>
+            <p:ph type="ftr" idx="1"/>
           </p:nvPr>
         </p:nvSpPr>
         <p:spPr/>
@@ -1579,14 +1578,14 @@
             <a:spLocks noGrp="1"/>
           </p:cNvSpPr>
           <p:nvPr>
-            <p:ph type="sldNum" idx="3"/>
-          </p:nvPr>
-        </p:nvSpPr>
-        <p:spPr/>
-        <p:txBody>
-          <a:bodyPr/>
-          <a:p>
-            <a:fld id="{4FE89FA6-20D2-4F6E-98E9-BEF19FA9746B}" type="slidenum">
+            <p:ph type="sldNum" idx="2"/>
+          </p:nvPr>
+        </p:nvSpPr>
+        <p:spPr/>
+        <p:txBody>
+          <a:bodyPr/>
+          <a:p>
+            <a:fld id="{4A198384-3468-4EBA-9393-7AF9EE7F2247}" type="slidenum">
               <a:t>&lt;#&gt;</a:t>
             </a:fld>
           </a:p>
@@ -1599,7 +1598,7 @@
             <a:spLocks noGrp="1"/>
           </p:cNvSpPr>
           <p:nvPr>
-            <p:ph type="dt" idx="1"/>
+            <p:ph type="dt" idx="3"/>
           </p:nvPr>
         </p:nvSpPr>
         <p:spPr/>
@@ -1637,7 +1636,7 @@
       </p:grpSpPr>
       <p:sp>
         <p:nvSpPr>
-          <p:cNvPr id="14" name="PlaceHolder 1"/>
+          <p:cNvPr id="13" name="PlaceHolder 1"/>
           <p:cNvSpPr>
             <a:spLocks noGrp="1"/>
           </p:cNvSpPr>
@@ -1648,7 +1647,7 @@
         <p:spPr>
           <a:xfrm>
             <a:off x="504000" y="226080"/>
-            <a:ext cx="9071640" cy="946440"/>
+            <a:ext cx="9071280" cy="946080"/>
           </a:xfrm>
           <a:prstGeom prst="rect">
             <a:avLst/>
@@ -1674,7 +1673,7 @@
       </p:sp>
       <p:sp>
         <p:nvSpPr>
-          <p:cNvPr id="15" name="PlaceHolder 2"/>
+          <p:cNvPr id="14" name="PlaceHolder 2"/>
           <p:cNvSpPr>
             <a:spLocks noGrp="1"/>
           </p:cNvSpPr>
@@ -1685,7 +1684,7 @@
         <p:spPr>
           <a:xfrm>
             <a:off x="504000" y="1326600"/>
-            <a:ext cx="4426920" cy="1568160"/>
+            <a:ext cx="4426920" cy="1568520"/>
           </a:xfrm>
           <a:prstGeom prst="rect">
             <a:avLst/>
@@ -1708,7 +1707,7 @@
       </p:sp>
       <p:sp>
         <p:nvSpPr>
-          <p:cNvPr id="16" name="PlaceHolder 3"/>
+          <p:cNvPr id="15" name="PlaceHolder 3"/>
           <p:cNvSpPr>
             <a:spLocks noGrp="1"/>
           </p:cNvSpPr>
@@ -1719,7 +1718,7 @@
         <p:spPr>
           <a:xfrm>
             <a:off x="5152680" y="1326600"/>
-            <a:ext cx="4426920" cy="3288240"/>
+            <a:ext cx="4426920" cy="3288600"/>
           </a:xfrm>
           <a:prstGeom prst="rect">
             <a:avLst/>
@@ -1742,7 +1741,7 @@
       </p:sp>
       <p:sp>
         <p:nvSpPr>
-          <p:cNvPr id="17" name="PlaceHolder 4"/>
+          <p:cNvPr id="16" name="PlaceHolder 4"/>
           <p:cNvSpPr>
             <a:spLocks noGrp="1"/>
           </p:cNvSpPr>
@@ -1752,8 +1751,8 @@
         </p:nvSpPr>
         <p:spPr>
           <a:xfrm>
-            <a:off x="504000" y="3044160"/>
-            <a:ext cx="4426920" cy="1568160"/>
+            <a:off x="504000" y="3044520"/>
+            <a:ext cx="4426920" cy="1568520"/>
           </a:xfrm>
           <a:prstGeom prst="rect">
             <a:avLst/>
@@ -1781,7 +1780,7 @@
             <a:spLocks noGrp="1"/>
           </p:cNvSpPr>
           <p:nvPr>
-            <p:ph type="ftr" idx="2"/>
+            <p:ph type="ftr" idx="1"/>
           </p:nvPr>
         </p:nvSpPr>
         <p:spPr/>
@@ -1801,14 +1800,14 @@
             <a:spLocks noGrp="1"/>
           </p:cNvSpPr>
           <p:nvPr>
-            <p:ph type="sldNum" idx="3"/>
-          </p:nvPr>
-        </p:nvSpPr>
-        <p:spPr/>
-        <p:txBody>
-          <a:bodyPr/>
-          <a:p>
-            <a:fld id="{44784028-2546-4BDE-AD93-FA8700F2886C}" type="slidenum">
+            <p:ph type="sldNum" idx="2"/>
+          </p:nvPr>
+        </p:nvSpPr>
+        <p:spPr/>
+        <p:txBody>
+          <a:bodyPr/>
+          <a:p>
+            <a:fld id="{244A92A5-A6D9-40CB-9ECA-C99C2CDBBEB9}" type="slidenum">
               <a:t>&lt;#&gt;</a:t>
             </a:fld>
           </a:p>
@@ -1821,7 +1820,7 @@
             <a:spLocks noGrp="1"/>
           </p:cNvSpPr>
           <p:nvPr>
-            <p:ph type="dt" idx="1"/>
+            <p:ph type="dt" idx="3"/>
           </p:nvPr>
         </p:nvSpPr>
         <p:spPr/>
@@ -1859,7 +1858,7 @@
       </p:grpSpPr>
       <p:sp>
         <p:nvSpPr>
-          <p:cNvPr id="18" name="PlaceHolder 1"/>
+          <p:cNvPr id="17" name="PlaceHolder 1"/>
           <p:cNvSpPr>
             <a:spLocks noGrp="1"/>
           </p:cNvSpPr>
@@ -1870,7 +1869,7 @@
         <p:spPr>
           <a:xfrm>
             <a:off x="504000" y="226080"/>
-            <a:ext cx="9071640" cy="946440"/>
+            <a:ext cx="9071280" cy="946080"/>
           </a:xfrm>
           <a:prstGeom prst="rect">
             <a:avLst/>
@@ -1896,7 +1895,7 @@
       </p:sp>
       <p:sp>
         <p:nvSpPr>
-          <p:cNvPr id="19" name="PlaceHolder 2"/>
+          <p:cNvPr id="18" name="PlaceHolder 2"/>
           <p:cNvSpPr>
             <a:spLocks noGrp="1"/>
           </p:cNvSpPr>
@@ -1907,7 +1906,7 @@
         <p:spPr>
           <a:xfrm>
             <a:off x="504000" y="1326600"/>
-            <a:ext cx="4426920" cy="3288240"/>
+            <a:ext cx="4426920" cy="3288600"/>
           </a:xfrm>
           <a:prstGeom prst="rect">
             <a:avLst/>
@@ -1930,7 +1929,7 @@
       </p:sp>
       <p:sp>
         <p:nvSpPr>
-          <p:cNvPr id="20" name="PlaceHolder 3"/>
+          <p:cNvPr id="19" name="PlaceHolder 3"/>
           <p:cNvSpPr>
             <a:spLocks noGrp="1"/>
           </p:cNvSpPr>
@@ -1941,7 +1940,7 @@
         <p:spPr>
           <a:xfrm>
             <a:off x="5152680" y="1326600"/>
-            <a:ext cx="4426920" cy="1568160"/>
+            <a:ext cx="4426920" cy="1568520"/>
           </a:xfrm>
           <a:prstGeom prst="rect">
             <a:avLst/>
@@ -1964,7 +1963,7 @@
       </p:sp>
       <p:sp>
         <p:nvSpPr>
-          <p:cNvPr id="21" name="PlaceHolder 4"/>
+          <p:cNvPr id="20" name="PlaceHolder 4"/>
           <p:cNvSpPr>
             <a:spLocks noGrp="1"/>
           </p:cNvSpPr>
@@ -1974,8 +1973,8 @@
         </p:nvSpPr>
         <p:spPr>
           <a:xfrm>
-            <a:off x="5152680" y="3044160"/>
-            <a:ext cx="4426920" cy="1568160"/>
+            <a:off x="5152680" y="3044520"/>
+            <a:ext cx="4426920" cy="1568520"/>
           </a:xfrm>
           <a:prstGeom prst="rect">
             <a:avLst/>
@@ -2003,7 +2002,7 @@
             <a:spLocks noGrp="1"/>
           </p:cNvSpPr>
           <p:nvPr>
-            <p:ph type="ftr" idx="2"/>
+            <p:ph type="ftr" idx="1"/>
           </p:nvPr>
         </p:nvSpPr>
         <p:spPr/>
@@ -2023,14 +2022,14 @@
             <a:spLocks noGrp="1"/>
           </p:cNvSpPr>
           <p:nvPr>
-            <p:ph type="sldNum" idx="3"/>
-          </p:nvPr>
-        </p:nvSpPr>
-        <p:spPr/>
-        <p:txBody>
-          <a:bodyPr/>
-          <a:p>
-            <a:fld id="{7CC7FFBC-137C-409F-81A9-33FB4B40D67E}" type="slidenum">
+            <p:ph type="sldNum" idx="2"/>
+          </p:nvPr>
+        </p:nvSpPr>
+        <p:spPr/>
+        <p:txBody>
+          <a:bodyPr/>
+          <a:p>
+            <a:fld id="{2C66B3FC-4FF2-49C2-8E5A-42CE46F0EBB4}" type="slidenum">
               <a:t>&lt;#&gt;</a:t>
             </a:fld>
           </a:p>
@@ -2043,7 +2042,7 @@
             <a:spLocks noGrp="1"/>
           </p:cNvSpPr>
           <p:nvPr>
-            <p:ph type="dt" idx="1"/>
+            <p:ph type="dt" idx="3"/>
           </p:nvPr>
         </p:nvSpPr>
         <p:spPr/>
@@ -2081,7 +2080,7 @@
       </p:grpSpPr>
       <p:sp>
         <p:nvSpPr>
-          <p:cNvPr id="22" name="PlaceHolder 1"/>
+          <p:cNvPr id="21" name="PlaceHolder 1"/>
           <p:cNvSpPr>
             <a:spLocks noGrp="1"/>
           </p:cNvSpPr>
@@ -2092,7 +2091,7 @@
         <p:spPr>
           <a:xfrm>
             <a:off x="504000" y="226080"/>
-            <a:ext cx="9071640" cy="946440"/>
+            <a:ext cx="9071280" cy="946080"/>
           </a:xfrm>
           <a:prstGeom prst="rect">
             <a:avLst/>
@@ -2118,7 +2117,7 @@
       </p:sp>
       <p:sp>
         <p:nvSpPr>
-          <p:cNvPr id="23" name="PlaceHolder 2"/>
+          <p:cNvPr id="22" name="PlaceHolder 2"/>
           <p:cNvSpPr>
             <a:spLocks noGrp="1"/>
           </p:cNvSpPr>
@@ -2129,7 +2128,7 @@
         <p:spPr>
           <a:xfrm>
             <a:off x="504000" y="1326600"/>
-            <a:ext cx="4426920" cy="1568160"/>
+            <a:ext cx="4426920" cy="1568520"/>
           </a:xfrm>
           <a:prstGeom prst="rect">
             <a:avLst/>
@@ -2152,7 +2151,7 @@
       </p:sp>
       <p:sp>
         <p:nvSpPr>
-          <p:cNvPr id="24" name="PlaceHolder 3"/>
+          <p:cNvPr id="23" name="PlaceHolder 3"/>
           <p:cNvSpPr>
             <a:spLocks noGrp="1"/>
           </p:cNvSpPr>
@@ -2163,7 +2162,7 @@
         <p:spPr>
           <a:xfrm>
             <a:off x="5152680" y="1326600"/>
-            <a:ext cx="4426920" cy="1568160"/>
+            <a:ext cx="4426920" cy="1568520"/>
           </a:xfrm>
           <a:prstGeom prst="rect">
             <a:avLst/>
@@ -2186,7 +2185,7 @@
       </p:sp>
       <p:sp>
         <p:nvSpPr>
-          <p:cNvPr id="25" name="PlaceHolder 4"/>
+          <p:cNvPr id="24" name="PlaceHolder 4"/>
           <p:cNvSpPr>
             <a:spLocks noGrp="1"/>
           </p:cNvSpPr>
@@ -2196,8 +2195,8 @@
         </p:nvSpPr>
         <p:spPr>
           <a:xfrm>
-            <a:off x="504000" y="3044160"/>
-            <a:ext cx="9071640" cy="1568160"/>
+            <a:off x="504000" y="3044520"/>
+            <a:ext cx="9072000" cy="1568520"/>
           </a:xfrm>
           <a:prstGeom prst="rect">
             <a:avLst/>
@@ -2225,7 +2224,7 @@
             <a:spLocks noGrp="1"/>
           </p:cNvSpPr>
           <p:nvPr>
-            <p:ph type="ftr" idx="2"/>
+            <p:ph type="ftr" idx="1"/>
           </p:nvPr>
         </p:nvSpPr>
         <p:spPr/>
@@ -2245,14 +2244,14 @@
             <a:spLocks noGrp="1"/>
           </p:cNvSpPr>
           <p:nvPr>
-            <p:ph type="sldNum" idx="3"/>
-          </p:nvPr>
-        </p:nvSpPr>
-        <p:spPr/>
-        <p:txBody>
-          <a:bodyPr/>
-          <a:p>
-            <a:fld id="{2808BE9A-EA4C-4EB0-AC60-7ED22731012D}" type="slidenum">
+            <p:ph type="sldNum" idx="2"/>
+          </p:nvPr>
+        </p:nvSpPr>
+        <p:spPr/>
+        <p:txBody>
+          <a:bodyPr/>
+          <a:p>
+            <a:fld id="{B7FEF476-6590-434C-AC1E-7B682C6F42B2}" type="slidenum">
               <a:t>&lt;#&gt;</a:t>
             </a:fld>
           </a:p>
@@ -2265,7 +2264,7 @@
             <a:spLocks noGrp="1"/>
           </p:cNvSpPr>
           <p:nvPr>
-            <p:ph type="dt" idx="1"/>
+            <p:ph type="dt" idx="3"/>
           </p:nvPr>
         </p:nvSpPr>
         <p:spPr/>
@@ -2314,7 +2313,7 @@
         <p:spPr>
           <a:xfrm>
             <a:off x="504000" y="226080"/>
-            <a:ext cx="9071640" cy="946440"/>
+            <a:ext cx="9071280" cy="946080"/>
           </a:xfrm>
           <a:prstGeom prst="rect">
             <a:avLst/>
@@ -2329,16 +2328,13 @@
             <a:noAutofit/>
           </a:bodyPr>
           <a:p>
-            <a:pPr algn="ctr">
-              <a:buNone/>
-            </a:pPr>
-            <a:r>
-              <a:rPr b="0" lang="en-US" sz="4400" spc="-1" strike="noStrike">
+            <a:r>
+              <a:rPr b="0" lang="en-US" sz="1800" spc="-1" strike="noStrike">
                 <a:latin typeface="Arial"/>
               </a:rPr>
               <a:t>Click to edit the title text format</a:t>
             </a:r>
-            <a:endParaRPr b="0" lang="en-US" sz="4400" spc="-1" strike="noStrike">
+            <a:endParaRPr b="0" lang="en-US" sz="1800" spc="-1" strike="noStrike">
               <a:latin typeface="Arial"/>
             </a:endParaRPr>
           </a:p>
@@ -2351,13 +2347,13 @@
             <a:spLocks noGrp="1"/>
           </p:cNvSpPr>
           <p:nvPr>
-            <p:ph type="body"/>
-          </p:nvPr>
-        </p:nvSpPr>
-        <p:spPr>
-          <a:xfrm>
-            <a:off x="504000" y="1326600"/>
-            <a:ext cx="9071640" cy="3288240"/>
+            <p:ph type="ftr" idx="1"/>
+          </p:nvPr>
+        </p:nvSpPr>
+        <p:spPr>
+          <a:xfrm>
+            <a:off x="3447360" y="5165280"/>
+            <a:ext cx="3194640" cy="390240"/>
           </a:xfrm>
           <a:prstGeom prst="rect">
             <a:avLst/>
@@ -2369,178 +2365,109 @@
         </p:spPr>
         <p:txBody>
           <a:bodyPr lIns="0" rIns="0" tIns="0" bIns="0" anchor="t">
-            <a:normAutofit/>
-          </a:bodyPr>
-          <a:p>
-            <a:pPr marL="432000" indent="-324000">
-              <a:spcBef>
-                <a:spcPts val="1417"/>
-              </a:spcBef>
-              <a:buClr>
-                <a:srgbClr val="000000"/>
-              </a:buClr>
-              <a:buSzPct val="45000"/>
-              <a:buFont typeface="Wingdings" charset="2"/>
-              <a:buChar char=""/>
+            <a:noAutofit/>
+          </a:bodyPr>
+          <a:lstStyle>
+            <a:lvl1pPr algn="ctr">
+              <a:lnSpc>
+                <a:spcPct val="100000"/>
+              </a:lnSpc>
+              <a:buNone/>
+              <a:defRPr b="0" lang="en-US" sz="1400" spc="-1" strike="noStrike">
+                <a:latin typeface="Times New Roman"/>
+              </a:defRPr>
+            </a:lvl1pPr>
+          </a:lstStyle>
+          <a:p>
+            <a:pPr algn="ctr">
+              <a:lnSpc>
+                <a:spcPct val="100000"/>
+              </a:lnSpc>
+              <a:buNone/>
             </a:pPr>
             <a:r>
-              <a:rPr b="0" lang="en-US" sz="3200" spc="-1" strike="noStrike">
-                <a:latin typeface="Arial"/>
+              <a:rPr b="0" lang="en-US" sz="1400" spc="-1" strike="noStrike">
+                <a:latin typeface="Times New Roman"/>
               </a:rPr>
-              <a:t>Click to edit the outline text format</a:t>
-            </a:r>
-            <a:endParaRPr b="0" lang="en-US" sz="3200" spc="-1" strike="noStrike">
-              <a:latin typeface="Arial"/>
-            </a:endParaRPr>
-          </a:p>
-          <a:p>
-            <a:pPr lvl="1" marL="864000" indent="-324000">
-              <a:spcBef>
-                <a:spcPts val="1134"/>
-              </a:spcBef>
-              <a:buClr>
-                <a:srgbClr val="000000"/>
-              </a:buClr>
-              <a:buSzPct val="75000"/>
-              <a:buFont typeface="Symbol" charset="2"/>
-              <a:buChar char=""/>
+              <a:t>&lt;footer&gt;</a:t>
+            </a:r>
+            <a:endParaRPr b="0" lang="en-US" sz="1400" spc="-1" strike="noStrike">
+              <a:latin typeface="Times New Roman"/>
+            </a:endParaRPr>
+          </a:p>
+        </p:txBody>
+      </p:sp>
+      <p:sp>
+        <p:nvSpPr>
+          <p:cNvPr id="2" name="PlaceHolder 3"/>
+          <p:cNvSpPr>
+            <a:spLocks noGrp="1"/>
+          </p:cNvSpPr>
+          <p:nvPr>
+            <p:ph type="sldNum" idx="2"/>
+          </p:nvPr>
+        </p:nvSpPr>
+        <p:spPr>
+          <a:xfrm>
+            <a:off x="7227360" y="5165280"/>
+            <a:ext cx="2347920" cy="390240"/>
+          </a:xfrm>
+          <a:prstGeom prst="rect">
+            <a:avLst/>
+          </a:prstGeom>
+          <a:noFill/>
+          <a:ln w="0">
+            <a:noFill/>
+          </a:ln>
+        </p:spPr>
+        <p:txBody>
+          <a:bodyPr lIns="0" rIns="0" tIns="0" bIns="0" anchor="t">
+            <a:noAutofit/>
+          </a:bodyPr>
+          <a:lstStyle>
+            <a:lvl1pPr algn="r">
+              <a:lnSpc>
+                <a:spcPct val="100000"/>
+              </a:lnSpc>
+              <a:buNone/>
+              <a:defRPr b="0" lang="en-US" sz="1400" spc="-1" strike="noStrike">
+                <a:latin typeface="Times New Roman"/>
+              </a:defRPr>
+            </a:lvl1pPr>
+          </a:lstStyle>
+          <a:p>
+            <a:pPr algn="r">
+              <a:lnSpc>
+                <a:spcPct val="100000"/>
+              </a:lnSpc>
+              <a:buNone/>
             </a:pPr>
-            <a:r>
-              <a:rPr b="0" lang="en-US" sz="2800" spc="-1" strike="noStrike">
-                <a:latin typeface="Arial"/>
+            <a:fld id="{31405F93-3BA1-4A94-B04A-1F9AFC3CB7FF}" type="slidenum">
+              <a:rPr b="0" lang="en-US" sz="1400" spc="-1" strike="noStrike">
+                <a:latin typeface="Times New Roman"/>
               </a:rPr>
-              <a:t>Second Outline Level</a:t>
-            </a:r>
-            <a:endParaRPr b="0" lang="en-US" sz="2800" spc="-1" strike="noStrike">
-              <a:latin typeface="Arial"/>
-            </a:endParaRPr>
-          </a:p>
-          <a:p>
-            <a:pPr lvl="2" marL="1296000" indent="-288000">
-              <a:spcBef>
-                <a:spcPts val="850"/>
-              </a:spcBef>
-              <a:buClr>
-                <a:srgbClr val="000000"/>
-              </a:buClr>
-              <a:buSzPct val="45000"/>
-              <a:buFont typeface="Wingdings" charset="2"/>
-              <a:buChar char=""/>
-            </a:pPr>
-            <a:r>
-              <a:rPr b="0" lang="en-US" sz="2400" spc="-1" strike="noStrike">
-                <a:latin typeface="Arial"/>
-              </a:rPr>
-              <a:t>Third Outline Level</a:t>
-            </a:r>
-            <a:endParaRPr b="0" lang="en-US" sz="2400" spc="-1" strike="noStrike">
-              <a:latin typeface="Arial"/>
-            </a:endParaRPr>
-          </a:p>
-          <a:p>
-            <a:pPr lvl="3" marL="1728000" indent="-216000">
-              <a:spcBef>
-                <a:spcPts val="567"/>
-              </a:spcBef>
-              <a:buClr>
-                <a:srgbClr val="000000"/>
-              </a:buClr>
-              <a:buSzPct val="75000"/>
-              <a:buFont typeface="Symbol" charset="2"/>
-              <a:buChar char=""/>
-            </a:pPr>
-            <a:r>
-              <a:rPr b="0" lang="en-US" sz="2000" spc="-1" strike="noStrike">
-                <a:latin typeface="Arial"/>
-              </a:rPr>
-              <a:t>Fourth Outline Level</a:t>
-            </a:r>
-            <a:endParaRPr b="0" lang="en-US" sz="2000" spc="-1" strike="noStrike">
-              <a:latin typeface="Arial"/>
-            </a:endParaRPr>
-          </a:p>
-          <a:p>
-            <a:pPr lvl="4" marL="2160000" indent="-216000">
-              <a:spcBef>
-                <a:spcPts val="283"/>
-              </a:spcBef>
-              <a:buClr>
-                <a:srgbClr val="000000"/>
-              </a:buClr>
-              <a:buSzPct val="45000"/>
-              <a:buFont typeface="Wingdings" charset="2"/>
-              <a:buChar char=""/>
-            </a:pPr>
-            <a:r>
-              <a:rPr b="0" lang="en-US" sz="2000" spc="-1" strike="noStrike">
-                <a:latin typeface="Arial"/>
-              </a:rPr>
-              <a:t>Fifth Outline Level</a:t>
-            </a:r>
-            <a:endParaRPr b="0" lang="en-US" sz="2000" spc="-1" strike="noStrike">
-              <a:latin typeface="Arial"/>
-            </a:endParaRPr>
-          </a:p>
-          <a:p>
-            <a:pPr lvl="5" marL="2592000" indent="-216000">
-              <a:spcBef>
-                <a:spcPts val="283"/>
-              </a:spcBef>
-              <a:buClr>
-                <a:srgbClr val="000000"/>
-              </a:buClr>
-              <a:buSzPct val="45000"/>
-              <a:buFont typeface="Wingdings" charset="2"/>
-              <a:buChar char=""/>
-            </a:pPr>
-            <a:r>
-              <a:rPr b="0" lang="en-US" sz="2000" spc="-1" strike="noStrike">
-                <a:latin typeface="Arial"/>
-              </a:rPr>
-              <a:t>Sixth Outline Level</a:t>
-            </a:r>
-            <a:endParaRPr b="0" lang="en-US" sz="2000" spc="-1" strike="noStrike">
-              <a:latin typeface="Arial"/>
-            </a:endParaRPr>
-          </a:p>
-          <a:p>
-            <a:pPr lvl="6" marL="3024000" indent="-216000">
-              <a:spcBef>
-                <a:spcPts val="283"/>
-              </a:spcBef>
-              <a:buClr>
-                <a:srgbClr val="000000"/>
-              </a:buClr>
-              <a:buSzPct val="45000"/>
-              <a:buFont typeface="Wingdings" charset="2"/>
-              <a:buChar char=""/>
-            </a:pPr>
-            <a:r>
-              <a:rPr b="0" lang="en-US" sz="2000" spc="-1" strike="noStrike">
-                <a:latin typeface="Arial"/>
-              </a:rPr>
-              <a:t>Seventh Outline Level</a:t>
-            </a:r>
-            <a:endParaRPr b="0" lang="en-US" sz="2000" spc="-1" strike="noStrike">
-              <a:latin typeface="Arial"/>
-            </a:endParaRPr>
-          </a:p>
-        </p:txBody>
-      </p:sp>
-      <p:sp>
-        <p:nvSpPr>
-          <p:cNvPr id="2" name="PlaceHolder 3"/>
-          <p:cNvSpPr>
-            <a:spLocks noGrp="1"/>
-          </p:cNvSpPr>
-          <p:nvPr>
-            <p:ph type="dt" idx="1"/>
+              <a:t>&lt;number&gt;</a:t>
+            </a:fld>
+            <a:endParaRPr b="0" lang="en-US" sz="1400" spc="-1" strike="noStrike">
+              <a:latin typeface="Times New Roman"/>
+            </a:endParaRPr>
+          </a:p>
+        </p:txBody>
+      </p:sp>
+      <p:sp>
+        <p:nvSpPr>
+          <p:cNvPr id="3" name="PlaceHolder 4"/>
+          <p:cNvSpPr>
+            <a:spLocks noGrp="1"/>
+          </p:cNvSpPr>
+          <p:nvPr>
+            <p:ph type="dt" idx="3"/>
           </p:nvPr>
         </p:nvSpPr>
         <p:spPr>
           <a:xfrm>
             <a:off x="504000" y="5165280"/>
-            <a:ext cx="2348280" cy="390600"/>
+            <a:ext cx="2347920" cy="390240"/>
           </a:xfrm>
           <a:prstGeom prst="rect">
             <a:avLst/>
@@ -2568,108 +2495,6 @@
               </a:rPr>
               <a:t>&lt;date/time&gt;</a:t>
             </a:r>
-            <a:endParaRPr b="0" lang="en-US" sz="1400" spc="-1" strike="noStrike">
-              <a:latin typeface="Times New Roman"/>
-            </a:endParaRPr>
-          </a:p>
-        </p:txBody>
-      </p:sp>
-      <p:sp>
-        <p:nvSpPr>
-          <p:cNvPr id="3" name="PlaceHolder 4"/>
-          <p:cNvSpPr>
-            <a:spLocks noGrp="1"/>
-          </p:cNvSpPr>
-          <p:nvPr>
-            <p:ph type="ftr" idx="2"/>
-          </p:nvPr>
-        </p:nvSpPr>
-        <p:spPr>
-          <a:xfrm>
-            <a:off x="3447360" y="5165280"/>
-            <a:ext cx="3195000" cy="390600"/>
-          </a:xfrm>
-          <a:prstGeom prst="rect">
-            <a:avLst/>
-          </a:prstGeom>
-          <a:noFill/>
-          <a:ln w="0">
-            <a:noFill/>
-          </a:ln>
-        </p:spPr>
-        <p:txBody>
-          <a:bodyPr lIns="0" rIns="0" tIns="0" bIns="0" anchor="t">
-            <a:noAutofit/>
-          </a:bodyPr>
-          <a:lstStyle>
-            <a:lvl1pPr algn="ctr">
-              <a:buNone/>
-              <a:defRPr b="0" lang="en-US" sz="1400" spc="-1" strike="noStrike">
-                <a:latin typeface="Times New Roman"/>
-              </a:defRPr>
-            </a:lvl1pPr>
-          </a:lstStyle>
-          <a:p>
-            <a:pPr algn="ctr">
-              <a:buNone/>
-            </a:pPr>
-            <a:r>
-              <a:rPr b="0" lang="en-US" sz="1400" spc="-1" strike="noStrike">
-                <a:latin typeface="Times New Roman"/>
-              </a:rPr>
-              <a:t>&lt;footer&gt;</a:t>
-            </a:r>
-            <a:endParaRPr b="0" lang="en-US" sz="1400" spc="-1" strike="noStrike">
-              <a:latin typeface="Times New Roman"/>
-            </a:endParaRPr>
-          </a:p>
-        </p:txBody>
-      </p:sp>
-      <p:sp>
-        <p:nvSpPr>
-          <p:cNvPr id="4" name="PlaceHolder 5"/>
-          <p:cNvSpPr>
-            <a:spLocks noGrp="1"/>
-          </p:cNvSpPr>
-          <p:nvPr>
-            <p:ph type="sldNum" idx="3"/>
-          </p:nvPr>
-        </p:nvSpPr>
-        <p:spPr>
-          <a:xfrm>
-            <a:off x="7227360" y="5165280"/>
-            <a:ext cx="2348280" cy="390600"/>
-          </a:xfrm>
-          <a:prstGeom prst="rect">
-            <a:avLst/>
-          </a:prstGeom>
-          <a:noFill/>
-          <a:ln w="0">
-            <a:noFill/>
-          </a:ln>
-        </p:spPr>
-        <p:txBody>
-          <a:bodyPr lIns="0" rIns="0" tIns="0" bIns="0" anchor="t">
-            <a:noAutofit/>
-          </a:bodyPr>
-          <a:lstStyle>
-            <a:lvl1pPr algn="r">
-              <a:buNone/>
-              <a:defRPr b="0" lang="en-US" sz="1400" spc="-1" strike="noStrike">
-                <a:latin typeface="Times New Roman"/>
-              </a:defRPr>
-            </a:lvl1pPr>
-          </a:lstStyle>
-          <a:p>
-            <a:pPr algn="r">
-              <a:buNone/>
-            </a:pPr>
-            <a:fld id="{00DC7635-EEBA-4DC6-8F37-086D55C50666}" type="slidenum">
-              <a:rPr b="0" lang="en-US" sz="1400" spc="-1" strike="noStrike">
-                <a:latin typeface="Times New Roman"/>
-              </a:rPr>
-              <a:t>&lt;number&gt;</a:t>
-            </a:fld>
             <a:endParaRPr b="0" lang="en-US" sz="1400" spc="-1" strike="noStrike">
               <a:latin typeface="Times New Roman"/>
             </a:endParaRPr>
@@ -2715,7 +2540,7 @@
       </p:grpSpPr>
       <p:sp>
         <p:nvSpPr>
-          <p:cNvPr id="41" name="PlaceHolder 1"/>
+          <p:cNvPr id="40" name="PlaceHolder 1"/>
           <p:cNvSpPr>
             <a:spLocks noGrp="1"/>
           </p:cNvSpPr>
@@ -2726,7 +2551,7 @@
         <p:spPr>
           <a:xfrm>
             <a:off x="504000" y="226080"/>
-            <a:ext cx="9071640" cy="946440"/>
+            <a:ext cx="9071280" cy="946080"/>
           </a:xfrm>
           <a:prstGeom prst="rect">
             <a:avLst/>
@@ -2742,200 +2567,62 @@
           </a:bodyPr>
           <a:p>
             <a:pPr algn="ctr">
-              <a:buNone/>
-            </a:pPr>
-            <a:endParaRPr b="0" lang="en-US" sz="4400" spc="-1" strike="noStrike">
-              <a:latin typeface="Arial"/>
-            </a:endParaRPr>
-          </a:p>
-        </p:txBody>
-      </p:sp>
-      <p:sp>
-        <p:nvSpPr>
-          <p:cNvPr id="42" name="PlaceHolder 2"/>
-          <p:cNvSpPr>
-            <a:spLocks noGrp="1"/>
-          </p:cNvSpPr>
-          <p:nvPr>
-            <p:ph type="subTitle"/>
-          </p:nvPr>
-        </p:nvSpPr>
-        <p:spPr>
-          <a:xfrm>
-            <a:off x="504000" y="1326600"/>
-            <a:ext cx="9071640" cy="3288240"/>
-          </a:xfrm>
-          <a:prstGeom prst="rect">
-            <a:avLst/>
-          </a:prstGeom>
-          <a:noFill/>
-          <a:ln w="0">
-            <a:noFill/>
-          </a:ln>
-        </p:spPr>
-        <p:txBody>
-          <a:bodyPr lIns="0" rIns="0" tIns="0" bIns="0" anchor="ctr">
-            <a:noAutofit/>
-          </a:bodyPr>
-          <a:p>
-            <a:pPr algn="ctr">
+              <a:lnSpc>
+                <a:spcPct val="100000"/>
+              </a:lnSpc>
               <a:buNone/>
             </a:pPr>
             <a:r>
               <a:rPr b="0" lang="en-US" sz="3200" spc="-1" strike="noStrike">
                 <a:latin typeface="Arial"/>
               </a:rPr>
-              <a:t>h</a:t>
-            </a:r>
+              <a:t>https://plaintext.test.com</a:t>
+            </a:r>
+            <a:endParaRPr b="0" lang="en-US" sz="3200" spc="-1" strike="noStrike">
+              <a:latin typeface="Arial"/>
+            </a:endParaRPr>
+          </a:p>
+        </p:txBody>
+      </p:sp>
+      <p:sp>
+        <p:nvSpPr>
+          <p:cNvPr id="41" name="PlaceHolder 2"/>
+          <p:cNvSpPr>
+            <a:spLocks noGrp="1"/>
+          </p:cNvSpPr>
+          <p:nvPr>
+            <p:ph type="subTitle"/>
+          </p:nvPr>
+        </p:nvSpPr>
+        <p:spPr>
+          <a:xfrm>
+            <a:off x="504000" y="1326600"/>
+            <a:ext cx="9071280" cy="3287880"/>
+          </a:xfrm>
+          <a:prstGeom prst="rect">
+            <a:avLst/>
+          </a:prstGeom>
+          <a:noFill/>
+          <a:ln w="0">
+            <a:noFill/>
+          </a:ln>
+        </p:spPr>
+        <p:txBody>
+          <a:bodyPr lIns="0" rIns="0" tIns="0" bIns="0" anchor="ctr">
+            <a:noAutofit/>
+          </a:bodyPr>
+          <a:p>
+            <a:pPr algn="ctr">
+              <a:lnSpc>
+                <a:spcPct val="100000"/>
+              </a:lnSpc>
+              <a:buNone/>
+            </a:pPr>
             <a:r>
               <a:rPr b="0" lang="en-US" sz="3200" spc="-1" strike="noStrike">
                 <a:latin typeface="Arial"/>
               </a:rPr>
-              <a:t>t</a:t>
-            </a:r>
-            <a:r>
-              <a:rPr b="0" lang="en-US" sz="3200" spc="-1" strike="noStrike">
-                <a:latin typeface="Arial"/>
-              </a:rPr>
-              <a:t>t</a:t>
-            </a:r>
-            <a:r>
-              <a:rPr b="0" lang="en-US" sz="3200" spc="-1" strike="noStrike">
-                <a:latin typeface="Arial"/>
-              </a:rPr>
-              <a:t>p</a:t>
-            </a:r>
-            <a:r>
-              <a:rPr b="0" lang="en-US" sz="3200" spc="-1" strike="noStrike">
-                <a:latin typeface="Arial"/>
-              </a:rPr>
-              <a:t>s</a:t>
-            </a:r>
-            <a:r>
-              <a:rPr b="0" lang="en-US" sz="3200" spc="-1" strike="noStrike">
-                <a:latin typeface="Arial"/>
-              </a:rPr>
-              <a:t>:</a:t>
-            </a:r>
-            <a:r>
-              <a:rPr b="0" lang="en-US" sz="3200" spc="-1" strike="noStrike">
-                <a:latin typeface="Arial"/>
-              </a:rPr>
-              <a:t>/</a:t>
-            </a:r>
-            <a:r>
-              <a:rPr b="0" lang="en-US" sz="3200" spc="-1" strike="noStrike">
-                <a:latin typeface="Arial"/>
-              </a:rPr>
-              <a:t>/</a:t>
-            </a:r>
-            <a:r>
-              <a:rPr b="0" lang="en-US" sz="3200" spc="-1" strike="noStrike">
-                <a:latin typeface="Arial"/>
-              </a:rPr>
-              <a:t>p</a:t>
-            </a:r>
-            <a:r>
-              <a:rPr b="0" lang="en-US" sz="3200" spc="-1" strike="noStrike">
-                <a:latin typeface="Arial"/>
-              </a:rPr>
-              <a:t>l</a:t>
-            </a:r>
-            <a:r>
-              <a:rPr b="0" lang="en-US" sz="3200" spc="-1" strike="noStrike">
-                <a:latin typeface="Arial"/>
-              </a:rPr>
-              <a:t>a</a:t>
-            </a:r>
-            <a:r>
-              <a:rPr b="0" lang="en-US" sz="3200" spc="-1" strike="noStrike">
-                <a:latin typeface="Arial"/>
-              </a:rPr>
-              <a:t>i</a:t>
-            </a:r>
-            <a:r>
-              <a:rPr b="0" lang="en-US" sz="3200" spc="-1" strike="noStrike">
-                <a:latin typeface="Arial"/>
-              </a:rPr>
-              <a:t>n</a:t>
-            </a:r>
-            <a:r>
-              <a:rPr b="0" lang="en-US" sz="3200" spc="-1" strike="noStrike">
-                <a:latin typeface="Arial"/>
-              </a:rPr>
-              <a:t>t</a:t>
-            </a:r>
-            <a:r>
-              <a:rPr b="0" lang="en-US" sz="3200" spc="-1" strike="noStrike">
-                <a:latin typeface="Arial"/>
-              </a:rPr>
-              <a:t>e</a:t>
-            </a:r>
-            <a:r>
-              <a:rPr b="0" lang="en-US" sz="3200" spc="-1" strike="noStrike">
-                <a:latin typeface="Arial"/>
-              </a:rPr>
-              <a:t>x</a:t>
-            </a:r>
-            <a:r>
-              <a:rPr b="0" lang="en-US" sz="3200" spc="-1" strike="noStrike">
-                <a:latin typeface="Arial"/>
-              </a:rPr>
-              <a:t>t</a:t>
-            </a:r>
-            <a:r>
-              <a:rPr b="0" lang="en-US" sz="3200" spc="-1" strike="noStrike">
-                <a:latin typeface="Arial"/>
-              </a:rPr>
-              <a:t>.</a:t>
-            </a:r>
-            <a:r>
-              <a:rPr b="0" lang="en-US" sz="3200" spc="-1" strike="noStrike">
-                <a:latin typeface="Arial"/>
-              </a:rPr>
-              <a:t>t</a:t>
-            </a:r>
-            <a:r>
-              <a:rPr b="0" lang="en-US" sz="3200" spc="-1" strike="noStrike">
-                <a:latin typeface="Arial"/>
-              </a:rPr>
-              <a:t>e</a:t>
-            </a:r>
-            <a:r>
-              <a:rPr b="0" lang="en-US" sz="3200" spc="-1" strike="noStrike">
-                <a:latin typeface="Arial"/>
-              </a:rPr>
-              <a:t>s</a:t>
-            </a:r>
-            <a:r>
-              <a:rPr b="0" lang="en-US" sz="3200" spc="-1" strike="noStrike">
-                <a:latin typeface="Arial"/>
-              </a:rPr>
-              <a:t>t</a:t>
-            </a:r>
-            <a:r>
-              <a:rPr b="0" lang="en-US" sz="3200" spc="-1" strike="noStrike">
-                <a:latin typeface="Arial"/>
-              </a:rPr>
-              <a:t>.</a:t>
-            </a:r>
-            <a:r>
-              <a:rPr b="0" lang="en-US" sz="3200" spc="-1" strike="noStrike">
-                <a:latin typeface="Arial"/>
-              </a:rPr>
-              <a:t>c</a:t>
-            </a:r>
-            <a:r>
-              <a:rPr b="0" lang="en-US" sz="3200" spc="-1" strike="noStrike">
-                <a:latin typeface="Arial"/>
-              </a:rPr>
-              <a:t>o</a:t>
-            </a:r>
-            <a:r>
-              <a:rPr b="0" lang="en-US" sz="3200" spc="-1" strike="noStrike">
-                <a:latin typeface="Arial"/>
-              </a:rPr>
-              <a:t>m</a:t>
+              <a:t>https://plaintext.test.com</a:t>
             </a:r>
             <a:endParaRPr b="0" lang="en-US" sz="3200" spc="-1" strike="noStrike">
               <a:latin typeface="Arial"/>
@@ -2943,10 +2630,17 @@
           </a:p>
           <a:p>
             <a:pPr algn="ctr">
+              <a:lnSpc>
+                <a:spcPct val="100000"/>
+              </a:lnSpc>
               <a:buNone/>
             </a:pPr>
             <a:r>
-              <a:rPr b="0" lang="en-US" sz="3200" spc="-1" strike="noStrike">
+              <a:rPr b="0" lang="en-US" sz="3200" spc="-1" strike="noStrike" u="sng">
+                <a:solidFill>
+                  <a:srgbClr val="0000ff"/>
+                </a:solidFill>
+                <a:uFillTx/>
                 <a:latin typeface="Arial"/>
                 <a:hlinkClick r:id="rId1"/>
               </a:rPr>

</xml_diff>